<commit_message>
fix link and anime
</commit_message>
<xml_diff>
--- a/gender-spectrum.pptx
+++ b/gender-spectrum.pptx
@@ -5,22 +5,23 @@
     <p:sldMasterId id="2147483648" r:id="rId1"/>
   </p:sldMasterIdLst>
   <p:sldIdLst>
-    <p:sldId id="258" r:id="rId2"/>
-    <p:sldId id="259" r:id="rId3"/>
-    <p:sldId id="267" r:id="rId4"/>
-    <p:sldId id="260" r:id="rId5"/>
-    <p:sldId id="277" r:id="rId6"/>
-    <p:sldId id="278" r:id="rId7"/>
-    <p:sldId id="262" r:id="rId8"/>
-    <p:sldId id="279" r:id="rId9"/>
-    <p:sldId id="276" r:id="rId10"/>
-    <p:sldId id="280" r:id="rId11"/>
-    <p:sldId id="275" r:id="rId12"/>
-    <p:sldId id="281" r:id="rId13"/>
-    <p:sldId id="274" r:id="rId14"/>
-    <p:sldId id="282" r:id="rId15"/>
-    <p:sldId id="273" r:id="rId16"/>
-    <p:sldId id="283" r:id="rId17"/>
+    <p:sldId id="286" r:id="rId2"/>
+    <p:sldId id="287" r:id="rId3"/>
+    <p:sldId id="259" r:id="rId4"/>
+    <p:sldId id="267" r:id="rId5"/>
+    <p:sldId id="260" r:id="rId6"/>
+    <p:sldId id="277" r:id="rId7"/>
+    <p:sldId id="278" r:id="rId8"/>
+    <p:sldId id="262" r:id="rId9"/>
+    <p:sldId id="279" r:id="rId10"/>
+    <p:sldId id="276" r:id="rId11"/>
+    <p:sldId id="280" r:id="rId12"/>
+    <p:sldId id="275" r:id="rId13"/>
+    <p:sldId id="281" r:id="rId14"/>
+    <p:sldId id="274" r:id="rId15"/>
+    <p:sldId id="282" r:id="rId16"/>
+    <p:sldId id="273" r:id="rId17"/>
+    <p:sldId id="283" r:id="rId18"/>
   </p:sldIdLst>
   <p:sldSz cx="12192000" cy="6858000"/>
   <p:notesSz cx="6858000" cy="9144000"/>
@@ -274,7 +275,7 @@
           <a:p>
             <a:fld id="{128C3A97-44F6-421F-8C3D-D99EDB84694D}" type="datetimeFigureOut">
               <a:rPr lang="en-US" smtClean="0"/>
-              <a:t>4/24/2022</a:t>
+              <a:t>5/3/2022</a:t>
             </a:fld>
             <a:endParaRPr lang="en-US"/>
           </a:p>
@@ -472,7 +473,7 @@
           <a:p>
             <a:fld id="{128C3A97-44F6-421F-8C3D-D99EDB84694D}" type="datetimeFigureOut">
               <a:rPr lang="en-US" smtClean="0"/>
-              <a:t>4/24/2022</a:t>
+              <a:t>5/3/2022</a:t>
             </a:fld>
             <a:endParaRPr lang="en-US"/>
           </a:p>
@@ -680,7 +681,7 @@
           <a:p>
             <a:fld id="{128C3A97-44F6-421F-8C3D-D99EDB84694D}" type="datetimeFigureOut">
               <a:rPr lang="en-US" smtClean="0"/>
-              <a:t>4/24/2022</a:t>
+              <a:t>5/3/2022</a:t>
             </a:fld>
             <a:endParaRPr lang="en-US"/>
           </a:p>
@@ -878,7 +879,7 @@
           <a:p>
             <a:fld id="{128C3A97-44F6-421F-8C3D-D99EDB84694D}" type="datetimeFigureOut">
               <a:rPr lang="en-US" smtClean="0"/>
-              <a:t>4/24/2022</a:t>
+              <a:t>5/3/2022</a:t>
             </a:fld>
             <a:endParaRPr lang="en-US"/>
           </a:p>
@@ -1153,7 +1154,7 @@
           <a:p>
             <a:fld id="{128C3A97-44F6-421F-8C3D-D99EDB84694D}" type="datetimeFigureOut">
               <a:rPr lang="en-US" smtClean="0"/>
-              <a:t>4/24/2022</a:t>
+              <a:t>5/3/2022</a:t>
             </a:fld>
             <a:endParaRPr lang="en-US"/>
           </a:p>
@@ -1418,7 +1419,7 @@
           <a:p>
             <a:fld id="{128C3A97-44F6-421F-8C3D-D99EDB84694D}" type="datetimeFigureOut">
               <a:rPr lang="en-US" smtClean="0"/>
-              <a:t>4/24/2022</a:t>
+              <a:t>5/3/2022</a:t>
             </a:fld>
             <a:endParaRPr lang="en-US"/>
           </a:p>
@@ -1830,7 +1831,7 @@
           <a:p>
             <a:fld id="{128C3A97-44F6-421F-8C3D-D99EDB84694D}" type="datetimeFigureOut">
               <a:rPr lang="en-US" smtClean="0"/>
-              <a:t>4/24/2022</a:t>
+              <a:t>5/3/2022</a:t>
             </a:fld>
             <a:endParaRPr lang="en-US"/>
           </a:p>
@@ -1971,7 +1972,7 @@
           <a:p>
             <a:fld id="{128C3A97-44F6-421F-8C3D-D99EDB84694D}" type="datetimeFigureOut">
               <a:rPr lang="en-US" smtClean="0"/>
-              <a:t>4/24/2022</a:t>
+              <a:t>5/3/2022</a:t>
             </a:fld>
             <a:endParaRPr lang="en-US"/>
           </a:p>
@@ -2084,7 +2085,7 @@
           <a:p>
             <a:fld id="{128C3A97-44F6-421F-8C3D-D99EDB84694D}" type="datetimeFigureOut">
               <a:rPr lang="en-US" smtClean="0"/>
-              <a:t>4/24/2022</a:t>
+              <a:t>5/3/2022</a:t>
             </a:fld>
             <a:endParaRPr lang="en-US"/>
           </a:p>
@@ -2395,7 +2396,7 @@
           <a:p>
             <a:fld id="{128C3A97-44F6-421F-8C3D-D99EDB84694D}" type="datetimeFigureOut">
               <a:rPr lang="en-US" smtClean="0"/>
-              <a:t>4/24/2022</a:t>
+              <a:t>5/3/2022</a:t>
             </a:fld>
             <a:endParaRPr lang="en-US"/>
           </a:p>
@@ -2683,7 +2684,7 @@
           <a:p>
             <a:fld id="{128C3A97-44F6-421F-8C3D-D99EDB84694D}" type="datetimeFigureOut">
               <a:rPr lang="en-US" smtClean="0"/>
-              <a:t>4/24/2022</a:t>
+              <a:t>5/3/2022</a:t>
             </a:fld>
             <a:endParaRPr lang="en-US"/>
           </a:p>
@@ -2924,7 +2925,7 @@
           <a:p>
             <a:fld id="{128C3A97-44F6-421F-8C3D-D99EDB84694D}" type="datetimeFigureOut">
               <a:rPr lang="en-US" smtClean="0"/>
-              <a:t>4/24/2022</a:t>
+              <a:t>5/3/2022</a:t>
             </a:fld>
             <a:endParaRPr lang="en-US"/>
           </a:p>
@@ -3403,9 +3404,16 @@
                     <a:schemeClr val="bg1"/>
                   </a:solidFill>
                   <a:latin typeface="Avenir Next LT Pro" panose="020B0604020202020204" pitchFamily="34" charset="0"/>
+                  <a:hlinkClick r:id="rId2"/>
                 </a:rPr>
                 <a:t>Gender</a:t>
               </a:r>
+              <a:endParaRPr lang="en-US" sz="7200" dirty="0">
+                <a:solidFill>
+                  <a:schemeClr val="bg1"/>
+                </a:solidFill>
+                <a:latin typeface="Avenir Next LT Pro" panose="020B0604020202020204" pitchFamily="34" charset="0"/>
+              </a:endParaRPr>
             </a:p>
           </p:txBody>
         </p:sp>
@@ -3516,13 +3524,584 @@
     </p:spTree>
     <p:extLst>
       <p:ext uri="{BB962C8B-B14F-4D97-AF65-F5344CB8AC3E}">
-        <p14:creationId xmlns:p14="http://schemas.microsoft.com/office/powerpoint/2010/main" val="903219192"/>
+        <p14:creationId xmlns:p14="http://schemas.microsoft.com/office/powerpoint/2010/main" val="1068693070"/>
       </p:ext>
     </p:extLst>
   </p:cSld>
   <p:clrMapOvr>
     <a:masterClrMapping/>
   </p:clrMapOvr>
+</p:sld>
+</file>
+
+<file path=ppt/slides/slide10.xml><?xml version="1.0" encoding="utf-8"?>
+<p:sld xmlns:a="http://schemas.openxmlformats.org/drawingml/2006/main" xmlns:r="http://schemas.openxmlformats.org/officeDocument/2006/relationships" xmlns:p="http://schemas.openxmlformats.org/presentationml/2006/main">
+  <p:cSld>
+    <p:bg>
+      <p:bgPr>
+        <a:solidFill>
+          <a:srgbClr val="21B1E6"/>
+        </a:solidFill>
+        <a:effectLst/>
+      </p:bgPr>
+    </p:bg>
+    <p:spTree>
+      <p:nvGrpSpPr>
+        <p:cNvPr id="1" name=""/>
+        <p:cNvGrpSpPr/>
+        <p:nvPr/>
+      </p:nvGrpSpPr>
+      <p:grpSpPr>
+        <a:xfrm>
+          <a:off x="0" y="0"/>
+          <a:ext cx="0" cy="0"/>
+          <a:chOff x="0" y="0"/>
+          <a:chExt cx="0" cy="0"/>
+        </a:xfrm>
+      </p:grpSpPr>
+      <p:pic>
+        <p:nvPicPr>
+          <p:cNvPr id="4" name="Picture 3">
+            <a:extLst>
+              <a:ext uri="{FF2B5EF4-FFF2-40B4-BE49-F238E27FC236}">
+                <a16:creationId xmlns:a16="http://schemas.microsoft.com/office/drawing/2014/main" id="{B50AEBF2-69A9-4306-BCA1-2F0074CB863E}"/>
+              </a:ext>
+            </a:extLst>
+          </p:cNvPr>
+          <p:cNvPicPr>
+            <a:picLocks noChangeAspect="1"/>
+          </p:cNvPicPr>
+          <p:nvPr/>
+        </p:nvPicPr>
+        <p:blipFill>
+          <a:blip r:embed="rId2"/>
+          <a:stretch>
+            <a:fillRect/>
+          </a:stretch>
+        </p:blipFill>
+        <p:spPr>
+          <a:xfrm>
+            <a:off x="0" y="0"/>
+            <a:ext cx="12192000" cy="6858000"/>
+          </a:xfrm>
+          <a:prstGeom prst="rect">
+            <a:avLst/>
+          </a:prstGeom>
+        </p:spPr>
+      </p:pic>
+      <p:sp>
+        <p:nvSpPr>
+          <p:cNvPr id="9" name="Rectangle: Rounded Corners 8">
+            <a:extLst>
+              <a:ext uri="{FF2B5EF4-FFF2-40B4-BE49-F238E27FC236}">
+                <a16:creationId xmlns:a16="http://schemas.microsoft.com/office/drawing/2014/main" id="{CBA9F85D-2E7C-4513-A504-B2432B4D1723}"/>
+              </a:ext>
+            </a:extLst>
+          </p:cNvPr>
+          <p:cNvSpPr/>
+          <p:nvPr/>
+        </p:nvSpPr>
+        <p:spPr>
+          <a:xfrm>
+            <a:off x="561521" y="881814"/>
+            <a:ext cx="236593" cy="234292"/>
+          </a:xfrm>
+          <a:prstGeom prst="roundRect">
+            <a:avLst/>
+          </a:prstGeom>
+          <a:solidFill>
+            <a:srgbClr val="E68417"/>
+          </a:solidFill>
+          <a:ln>
+            <a:noFill/>
+          </a:ln>
+        </p:spPr>
+        <p:style>
+          <a:lnRef idx="2">
+            <a:schemeClr val="accent1">
+              <a:shade val="50000"/>
+            </a:schemeClr>
+          </a:lnRef>
+          <a:fillRef idx="1">
+            <a:schemeClr val="accent1"/>
+          </a:fillRef>
+          <a:effectRef idx="0">
+            <a:schemeClr val="accent1"/>
+          </a:effectRef>
+          <a:fontRef idx="minor">
+            <a:schemeClr val="lt1"/>
+          </a:fontRef>
+        </p:style>
+        <p:txBody>
+          <a:bodyPr rtlCol="0" anchor="ctr"/>
+          <a:lstStyle/>
+          <a:p>
+            <a:pPr algn="ctr"/>
+            <a:endParaRPr lang="en-US"/>
+          </a:p>
+        </p:txBody>
+      </p:sp>
+      <p:sp>
+        <p:nvSpPr>
+          <p:cNvPr id="2" name="TextBox 1">
+            <a:extLst>
+              <a:ext uri="{FF2B5EF4-FFF2-40B4-BE49-F238E27FC236}">
+                <a16:creationId xmlns:a16="http://schemas.microsoft.com/office/drawing/2014/main" id="{B28EEF6C-89EF-4DEC-8D65-E3DF9800F127}"/>
+              </a:ext>
+            </a:extLst>
+          </p:cNvPr>
+          <p:cNvSpPr txBox="1"/>
+          <p:nvPr/>
+        </p:nvSpPr>
+        <p:spPr>
+          <a:xfrm>
+            <a:off x="463924" y="235323"/>
+            <a:ext cx="2649070" cy="584775"/>
+          </a:xfrm>
+          <a:prstGeom prst="rect">
+            <a:avLst/>
+          </a:prstGeom>
+          <a:noFill/>
+        </p:spPr>
+        <p:txBody>
+          <a:bodyPr wrap="square" rtlCol="0">
+            <a:spAutoFit/>
+          </a:bodyPr>
+          <a:lstStyle/>
+          <a:p>
+            <a:pPr algn="l"/>
+            <a:r>
+              <a:rPr lang="en-US" sz="3200" dirty="0">
+                <a:solidFill>
+                  <a:srgbClr val="D445E6"/>
+                </a:solidFill>
+                <a:highlight>
+                  <a:srgbClr val="21B1E6"/>
+                </a:highlight>
+                <a:latin typeface="Avenir Next LT Pro" panose="020B0604020202020204" pitchFamily="34" charset="0"/>
+              </a:rPr>
+              <a:t>N</a:t>
+            </a:r>
+            <a:r>
+              <a:rPr lang="en-US" sz="3200" dirty="0">
+                <a:solidFill>
+                  <a:schemeClr val="bg1"/>
+                </a:solidFill>
+                <a:highlight>
+                  <a:srgbClr val="21B1E6"/>
+                </a:highlight>
+                <a:latin typeface="Avenir Next LT Pro" panose="020B0604020202020204" pitchFamily="34" charset="0"/>
+              </a:rPr>
+              <a:t>o</a:t>
+            </a:r>
+            <a:r>
+              <a:rPr lang="en-US" sz="3200" dirty="0">
+                <a:solidFill>
+                  <a:srgbClr val="81E622"/>
+                </a:solidFill>
+                <a:highlight>
+                  <a:srgbClr val="21B1E6"/>
+                </a:highlight>
+                <a:latin typeface="Avenir Next LT Pro" panose="020B0604020202020204" pitchFamily="34" charset="0"/>
+              </a:rPr>
+              <a:t>t</a:t>
+            </a:r>
+            <a:r>
+              <a:rPr lang="en-US" sz="3200" dirty="0">
+                <a:solidFill>
+                  <a:schemeClr val="bg1"/>
+                </a:solidFill>
+                <a:highlight>
+                  <a:srgbClr val="21B1E6"/>
+                </a:highlight>
+                <a:latin typeface="Avenir Next LT Pro" panose="020B0604020202020204" pitchFamily="34" charset="0"/>
+              </a:rPr>
+              <a:t>e</a:t>
+            </a:r>
+            <a:r>
+              <a:rPr lang="en-US" sz="3200" dirty="0">
+                <a:solidFill>
+                  <a:srgbClr val="E68417"/>
+                </a:solidFill>
+                <a:highlight>
+                  <a:srgbClr val="21B1E6"/>
+                </a:highlight>
+                <a:latin typeface="Avenir Next LT Pro" panose="020B0604020202020204" pitchFamily="34" charset="0"/>
+              </a:rPr>
+              <a:t>s</a:t>
+            </a:r>
+          </a:p>
+        </p:txBody>
+      </p:sp>
+      <p:sp>
+        <p:nvSpPr>
+          <p:cNvPr id="3" name="Rectangle 2">
+            <a:extLst>
+              <a:ext uri="{FF2B5EF4-FFF2-40B4-BE49-F238E27FC236}">
+                <a16:creationId xmlns:a16="http://schemas.microsoft.com/office/drawing/2014/main" id="{1B978686-3627-499D-B7FC-70B0A0A2344C}"/>
+              </a:ext>
+            </a:extLst>
+          </p:cNvPr>
+          <p:cNvSpPr/>
+          <p:nvPr/>
+        </p:nvSpPr>
+        <p:spPr>
+          <a:xfrm>
+            <a:off x="1667434" y="295831"/>
+            <a:ext cx="658906" cy="457027"/>
+          </a:xfrm>
+          <a:prstGeom prst="rect">
+            <a:avLst/>
+          </a:prstGeom>
+          <a:solidFill>
+            <a:srgbClr val="21B1E6"/>
+          </a:solidFill>
+          <a:ln>
+            <a:noFill/>
+          </a:ln>
+        </p:spPr>
+        <p:style>
+          <a:lnRef idx="2">
+            <a:schemeClr val="accent1">
+              <a:shade val="50000"/>
+            </a:schemeClr>
+          </a:lnRef>
+          <a:fillRef idx="1">
+            <a:schemeClr val="accent1"/>
+          </a:fillRef>
+          <a:effectRef idx="0">
+            <a:schemeClr val="accent1"/>
+          </a:effectRef>
+          <a:fontRef idx="minor">
+            <a:schemeClr val="lt1"/>
+          </a:fontRef>
+        </p:style>
+        <p:txBody>
+          <a:bodyPr rtlCol="0" anchor="ctr"/>
+          <a:lstStyle/>
+          <a:p>
+            <a:pPr algn="ctr"/>
+            <a:endParaRPr lang="en-US"/>
+          </a:p>
+        </p:txBody>
+      </p:sp>
+      <p:sp>
+        <p:nvSpPr>
+          <p:cNvPr id="23" name="Rectangle: Rounded Corners 22">
+            <a:extLst>
+              <a:ext uri="{FF2B5EF4-FFF2-40B4-BE49-F238E27FC236}">
+                <a16:creationId xmlns:a16="http://schemas.microsoft.com/office/drawing/2014/main" id="{7788500E-33FF-4980-A5B8-BEA772A4CEB5}"/>
+              </a:ext>
+            </a:extLst>
+          </p:cNvPr>
+          <p:cNvSpPr/>
+          <p:nvPr/>
+        </p:nvSpPr>
+        <p:spPr>
+          <a:xfrm>
+            <a:off x="561520" y="-5929088"/>
+            <a:ext cx="236593" cy="6093868"/>
+          </a:xfrm>
+          <a:prstGeom prst="roundRect">
+            <a:avLst/>
+          </a:prstGeom>
+          <a:solidFill>
+            <a:srgbClr val="E68417"/>
+          </a:solidFill>
+          <a:ln>
+            <a:noFill/>
+          </a:ln>
+        </p:spPr>
+        <p:style>
+          <a:lnRef idx="2">
+            <a:schemeClr val="accent1">
+              <a:shade val="50000"/>
+            </a:schemeClr>
+          </a:lnRef>
+          <a:fillRef idx="1">
+            <a:schemeClr val="accent1"/>
+          </a:fillRef>
+          <a:effectRef idx="0">
+            <a:schemeClr val="accent1"/>
+          </a:effectRef>
+          <a:fontRef idx="minor">
+            <a:schemeClr val="lt1"/>
+          </a:fontRef>
+        </p:style>
+        <p:txBody>
+          <a:bodyPr rtlCol="0" anchor="ctr"/>
+          <a:lstStyle/>
+          <a:p>
+            <a:pPr algn="ctr"/>
+            <a:endParaRPr lang="en-US"/>
+          </a:p>
+        </p:txBody>
+      </p:sp>
+      <p:pic>
+        <p:nvPicPr>
+          <p:cNvPr id="7" name="Picture 6" descr="Text&#10;&#10;Description automatically generated with low confidence">
+            <a:extLst>
+              <a:ext uri="{FF2B5EF4-FFF2-40B4-BE49-F238E27FC236}">
+                <a16:creationId xmlns:a16="http://schemas.microsoft.com/office/drawing/2014/main" id="{FD420DCE-D2BC-41BD-A64C-09FDEC3289CA}"/>
+              </a:ext>
+            </a:extLst>
+          </p:cNvPr>
+          <p:cNvPicPr>
+            <a:picLocks noChangeAspect="1"/>
+          </p:cNvPicPr>
+          <p:nvPr/>
+        </p:nvPicPr>
+        <p:blipFill>
+          <a:blip r:embed="rId3">
+            <a:extLst>
+              <a:ext uri="{28A0092B-C50C-407E-A947-70E740481C1C}">
+                <a14:useLocalDpi xmlns:a14="http://schemas.microsoft.com/office/drawing/2010/main" val="0"/>
+              </a:ext>
+            </a:extLst>
+          </a:blip>
+          <a:stretch>
+            <a:fillRect/>
+          </a:stretch>
+        </p:blipFill>
+        <p:spPr>
+          <a:xfrm>
+            <a:off x="773360" y="711788"/>
+            <a:ext cx="10956281" cy="856219"/>
+          </a:xfrm>
+          <a:prstGeom prst="rect">
+            <a:avLst/>
+          </a:prstGeom>
+        </p:spPr>
+      </p:pic>
+      <p:pic>
+        <p:nvPicPr>
+          <p:cNvPr id="11" name="320" descr="Text&#10;&#10;Description automatically generated">
+            <a:extLst>
+              <a:ext uri="{FF2B5EF4-FFF2-40B4-BE49-F238E27FC236}">
+                <a16:creationId xmlns:a16="http://schemas.microsoft.com/office/drawing/2014/main" id="{A485440D-1157-4425-A376-F2EF3F01EA31}"/>
+              </a:ext>
+            </a:extLst>
+          </p:cNvPr>
+          <p:cNvPicPr>
+            <a:picLocks noChangeAspect="1"/>
+          </p:cNvPicPr>
+          <p:nvPr/>
+        </p:nvPicPr>
+        <p:blipFill>
+          <a:blip r:embed="rId4">
+            <a:extLst>
+              <a:ext uri="{28A0092B-C50C-407E-A947-70E740481C1C}">
+                <a14:useLocalDpi xmlns:a14="http://schemas.microsoft.com/office/drawing/2010/main" val="0"/>
+              </a:ext>
+            </a:extLst>
+          </a:blip>
+          <a:stretch>
+            <a:fillRect/>
+          </a:stretch>
+        </p:blipFill>
+        <p:spPr>
+          <a:xfrm>
+            <a:off x="977210" y="1427436"/>
+            <a:ext cx="4896244" cy="856219"/>
+          </a:xfrm>
+          <a:prstGeom prst="rect">
+            <a:avLst/>
+          </a:prstGeom>
+        </p:spPr>
+      </p:pic>
+      <p:pic>
+        <p:nvPicPr>
+          <p:cNvPr id="21" name="321" descr="Text&#10;&#10;Description automatically generated">
+            <a:extLst>
+              <a:ext uri="{FF2B5EF4-FFF2-40B4-BE49-F238E27FC236}">
+                <a16:creationId xmlns:a16="http://schemas.microsoft.com/office/drawing/2014/main" id="{CEACCA46-C532-4D22-975A-AEE8F7F11C62}"/>
+              </a:ext>
+            </a:extLst>
+          </p:cNvPr>
+          <p:cNvPicPr>
+            <a:picLocks noChangeAspect="1"/>
+          </p:cNvPicPr>
+          <p:nvPr/>
+        </p:nvPicPr>
+        <p:blipFill>
+          <a:blip r:embed="rId5">
+            <a:extLst>
+              <a:ext uri="{28A0092B-C50C-407E-A947-70E740481C1C}">
+                <a14:useLocalDpi xmlns:a14="http://schemas.microsoft.com/office/drawing/2010/main" val="0"/>
+              </a:ext>
+            </a:extLst>
+          </a:blip>
+          <a:stretch>
+            <a:fillRect/>
+          </a:stretch>
+        </p:blipFill>
+        <p:spPr>
+          <a:xfrm>
+            <a:off x="977210" y="2123744"/>
+            <a:ext cx="4832512" cy="856219"/>
+          </a:xfrm>
+          <a:prstGeom prst="rect">
+            <a:avLst/>
+          </a:prstGeom>
+        </p:spPr>
+      </p:pic>
+      <p:pic>
+        <p:nvPicPr>
+          <p:cNvPr id="26" name="323" descr="Text&#10;&#10;Description automatically generated">
+            <a:extLst>
+              <a:ext uri="{FF2B5EF4-FFF2-40B4-BE49-F238E27FC236}">
+                <a16:creationId xmlns:a16="http://schemas.microsoft.com/office/drawing/2014/main" id="{6FD8C824-A002-46F4-8A0B-7CE8C6F30C65}"/>
+              </a:ext>
+            </a:extLst>
+          </p:cNvPr>
+          <p:cNvPicPr>
+            <a:picLocks noChangeAspect="1"/>
+          </p:cNvPicPr>
+          <p:nvPr/>
+        </p:nvPicPr>
+        <p:blipFill>
+          <a:blip r:embed="rId6">
+            <a:extLst>
+              <a:ext uri="{28A0092B-C50C-407E-A947-70E740481C1C}">
+                <a14:useLocalDpi xmlns:a14="http://schemas.microsoft.com/office/drawing/2010/main" val="0"/>
+              </a:ext>
+            </a:extLst>
+          </a:blip>
+          <a:stretch>
+            <a:fillRect/>
+          </a:stretch>
+        </p:blipFill>
+        <p:spPr>
+          <a:xfrm>
+            <a:off x="5946306" y="1427436"/>
+            <a:ext cx="2745998" cy="856219"/>
+          </a:xfrm>
+          <a:prstGeom prst="rect">
+            <a:avLst/>
+          </a:prstGeom>
+        </p:spPr>
+      </p:pic>
+      <p:pic>
+        <p:nvPicPr>
+          <p:cNvPr id="28" name="324" descr="Text&#10;&#10;Description automatically generated">
+            <a:extLst>
+              <a:ext uri="{FF2B5EF4-FFF2-40B4-BE49-F238E27FC236}">
+                <a16:creationId xmlns:a16="http://schemas.microsoft.com/office/drawing/2014/main" id="{374D56AC-E150-4742-ACFE-43083960B102}"/>
+              </a:ext>
+            </a:extLst>
+          </p:cNvPr>
+          <p:cNvPicPr>
+            <a:picLocks noChangeAspect="1"/>
+          </p:cNvPicPr>
+          <p:nvPr/>
+        </p:nvPicPr>
+        <p:blipFill>
+          <a:blip r:embed="rId7">
+            <a:extLst>
+              <a:ext uri="{28A0092B-C50C-407E-A947-70E740481C1C}">
+                <a14:useLocalDpi xmlns:a14="http://schemas.microsoft.com/office/drawing/2010/main" val="0"/>
+              </a:ext>
+            </a:extLst>
+          </a:blip>
+          <a:stretch>
+            <a:fillRect/>
+          </a:stretch>
+        </p:blipFill>
+        <p:spPr>
+          <a:xfrm>
+            <a:off x="8672721" y="1427436"/>
+            <a:ext cx="3314039" cy="856219"/>
+          </a:xfrm>
+          <a:prstGeom prst="rect">
+            <a:avLst/>
+          </a:prstGeom>
+        </p:spPr>
+      </p:pic>
+      <p:pic>
+        <p:nvPicPr>
+          <p:cNvPr id="30" name="df" descr="Text&#10;&#10;Description automatically generated">
+            <a:extLst>
+              <a:ext uri="{FF2B5EF4-FFF2-40B4-BE49-F238E27FC236}">
+                <a16:creationId xmlns:a16="http://schemas.microsoft.com/office/drawing/2014/main" id="{7CF033EE-174C-48AD-9291-8E3C5CD25113}"/>
+              </a:ext>
+            </a:extLst>
+          </p:cNvPr>
+          <p:cNvPicPr>
+            <a:picLocks noChangeAspect="1"/>
+          </p:cNvPicPr>
+          <p:nvPr/>
+        </p:nvPicPr>
+        <p:blipFill>
+          <a:blip r:embed="rId8">
+            <a:extLst>
+              <a:ext uri="{28A0092B-C50C-407E-A947-70E740481C1C}">
+                <a14:useLocalDpi xmlns:a14="http://schemas.microsoft.com/office/drawing/2010/main" val="0"/>
+              </a:ext>
+            </a:extLst>
+          </a:blip>
+          <a:stretch>
+            <a:fillRect/>
+          </a:stretch>
+        </p:blipFill>
+        <p:spPr>
+          <a:xfrm>
+            <a:off x="990816" y="2839346"/>
+            <a:ext cx="4333744" cy="856219"/>
+          </a:xfrm>
+          <a:prstGeom prst="rect">
+            <a:avLst/>
+          </a:prstGeom>
+        </p:spPr>
+      </p:pic>
+      <p:pic>
+        <p:nvPicPr>
+          <p:cNvPr id="6" name="Picture 5" descr="A picture containing text&#10;&#10;Description automatically generated">
+            <a:extLst>
+              <a:ext uri="{FF2B5EF4-FFF2-40B4-BE49-F238E27FC236}">
+                <a16:creationId xmlns:a16="http://schemas.microsoft.com/office/drawing/2014/main" id="{CC4EA2B5-7857-421E-8717-DE98505B8655}"/>
+              </a:ext>
+            </a:extLst>
+          </p:cNvPr>
+          <p:cNvPicPr>
+            <a:picLocks noChangeAspect="1"/>
+          </p:cNvPicPr>
+          <p:nvPr/>
+        </p:nvPicPr>
+        <p:blipFill>
+          <a:blip r:embed="rId9">
+            <a:extLst>
+              <a:ext uri="{28A0092B-C50C-407E-A947-70E740481C1C}">
+                <a14:useLocalDpi xmlns:a14="http://schemas.microsoft.com/office/drawing/2010/main" val="0"/>
+              </a:ext>
+            </a:extLst>
+          </a:blip>
+          <a:stretch>
+            <a:fillRect/>
+          </a:stretch>
+        </p:blipFill>
+        <p:spPr>
+          <a:xfrm>
+            <a:off x="5946306" y="2135402"/>
+            <a:ext cx="4386392" cy="856219"/>
+          </a:xfrm>
+          <a:prstGeom prst="rect">
+            <a:avLst/>
+          </a:prstGeom>
+        </p:spPr>
+      </p:pic>
+    </p:spTree>
+    <p:extLst>
+      <p:ext uri="{BB962C8B-B14F-4D97-AF65-F5344CB8AC3E}">
+        <p14:creationId xmlns:p14="http://schemas.microsoft.com/office/powerpoint/2010/main" val="3917785960"/>
+      </p:ext>
+    </p:extLst>
+  </p:cSld>
+  <p:clrMapOvr>
+    <a:masterClrMapping/>
+  </p:clrMapOvr>
+  <p:transition spd="slow">
+    <p:push dir="u"/>
+  </p:transition>
   <p:timing>
     <p:tnLst>
       <p:par>
@@ -3544,42 +4123,37 @@
                             </p:stCondLst>
                             <p:childTnLst>
                               <p:par>
-                                <p:cTn id="5" presetID="6" presetClass="emph" presetSubtype="0" fill="hold" nodeType="clickEffect">
+                                <p:cTn id="5" presetID="22" presetClass="entr" presetSubtype="8" fill="hold" nodeType="clickEffect">
                                   <p:stCondLst>
                                     <p:cond delay="0"/>
                                   </p:stCondLst>
                                   <p:childTnLst>
-                                    <p:animScale>
+                                    <p:set>
                                       <p:cBhvr>
-                                        <p:cTn id="6" dur="2000" fill="hold"/>
+                                        <p:cTn id="6" dur="1" fill="hold">
+                                          <p:stCondLst>
+                                            <p:cond delay="0"/>
+                                          </p:stCondLst>
+                                        </p:cTn>
                                         <p:tgtEl>
-                                          <p:spTgt spid="2"/>
+                                          <p:spTgt spid="30"/>
+                                        </p:tgtEl>
+                                        <p:attrNameLst>
+                                          <p:attrName>style.visibility</p:attrName>
+                                        </p:attrNameLst>
+                                      </p:cBhvr>
+                                      <p:to>
+                                        <p:strVal val="visible"/>
+                                      </p:to>
+                                    </p:set>
+                                    <p:animEffect transition="in" filter="wipe(left)">
+                                      <p:cBhvr>
+                                        <p:cTn id="7" dur="500"/>
+                                        <p:tgtEl>
+                                          <p:spTgt spid="30"/>
                                         </p:tgtEl>
                                       </p:cBhvr>
-                                      <p:by x="40000" y="40000"/>
-                                    </p:animScale>
-                                  </p:childTnLst>
-                                </p:cTn>
-                              </p:par>
-                              <p:par>
-                                <p:cTn id="7" presetID="35" presetClass="path" presetSubtype="0" accel="50000" decel="50000" fill="hold" nodeType="withEffect">
-                                  <p:stCondLst>
-                                    <p:cond delay="0"/>
-                                  </p:stCondLst>
-                                  <p:childTnLst>
-                                    <p:animMotion origin="layout" path="M 0.03568 -0.05579 L -0.35169 -0.40787 " pathEditMode="relative" rAng="0" ptsTypes="AA">
-                                      <p:cBhvr>
-                                        <p:cTn id="8" dur="2000" fill="hold"/>
-                                        <p:tgtEl>
-                                          <p:spTgt spid="2"/>
-                                        </p:tgtEl>
-                                        <p:attrNameLst>
-                                          <p:attrName>ppt_x</p:attrName>
-                                          <p:attrName>ppt_y</p:attrName>
-                                        </p:attrNameLst>
-                                      </p:cBhvr>
-                                      <p:rCtr x="-19375" y="-17616"/>
-                                    </p:animMotion>
+                                    </p:animEffect>
                                   </p:childTnLst>
                                 </p:cTn>
                               </p:par>
@@ -3614,7 +4188,7 @@
 </p:sld>
 </file>
 
-<file path=ppt/slides/slide10.xml><?xml version="1.0" encoding="utf-8"?>
+<file path=ppt/slides/slide11.xml><?xml version="1.0" encoding="utf-8"?>
 <p:sld xmlns:a="http://schemas.openxmlformats.org/drawingml/2006/main" xmlns:r="http://schemas.openxmlformats.org/officeDocument/2006/relationships" xmlns:p="http://schemas.openxmlformats.org/presentationml/2006/main">
   <p:cSld>
     <p:bg>
@@ -4144,6 +4718,7 @@
       <p:pic>
         <p:nvPicPr>
           <p:cNvPr id="22" name="4" descr="Logo, company name&#10;&#10;Description automatically generated">
+            <a:hlinkClick r:id="rId6"/>
             <a:extLst>
               <a:ext uri="{FF2B5EF4-FFF2-40B4-BE49-F238E27FC236}">
                 <a16:creationId xmlns:a16="http://schemas.microsoft.com/office/drawing/2014/main" id="{28DDE4A2-695F-44EA-A538-5AA05366F41C}"/>
@@ -4156,7 +4731,7 @@
           <p:nvPr/>
         </p:nvPicPr>
         <p:blipFill>
-          <a:blip r:embed="rId6">
+          <a:blip r:embed="rId7">
             <a:extLst>
               <a:ext uri="{28A0092B-C50C-407E-A947-70E740481C1C}">
                 <a14:useLocalDpi xmlns:a14="http://schemas.microsoft.com/office/drawing/2010/main" val="0"/>
@@ -4192,7 +4767,7 @@
           <p:nvPr/>
         </p:nvPicPr>
         <p:blipFill>
-          <a:blip r:embed="rId7">
+          <a:blip r:embed="rId8">
             <a:extLst>
               <a:ext uri="{28A0092B-C50C-407E-A947-70E740481C1C}">
                 <a14:useLocalDpi xmlns:a14="http://schemas.microsoft.com/office/drawing/2010/main" val="0"/>
@@ -4228,7 +4803,7 @@
           <p:nvPr/>
         </p:nvPicPr>
         <p:blipFill>
-          <a:blip r:embed="rId8">
+          <a:blip r:embed="rId9">
             <a:extLst>
               <a:ext uri="{28A0092B-C50C-407E-A947-70E740481C1C}">
                 <a14:useLocalDpi xmlns:a14="http://schemas.microsoft.com/office/drawing/2010/main" val="0"/>
@@ -4491,7 +5066,7 @@
 </p:sld>
 </file>
 
-<file path=ppt/slides/slide11.xml><?xml version="1.0" encoding="utf-8"?>
+<file path=ppt/slides/slide12.xml><?xml version="1.0" encoding="utf-8"?>
 <p:sld xmlns:a="http://schemas.openxmlformats.org/drawingml/2006/main" xmlns:r="http://schemas.openxmlformats.org/officeDocument/2006/relationships" xmlns:p="http://schemas.openxmlformats.org/presentationml/2006/main">
   <p:cSld>
     <p:bg>
@@ -5181,7 +5756,7 @@
 </p:sld>
 </file>
 
-<file path=ppt/slides/slide12.xml><?xml version="1.0" encoding="utf-8"?>
+<file path=ppt/slides/slide13.xml><?xml version="1.0" encoding="utf-8"?>
 <p:sld xmlns:a="http://schemas.openxmlformats.org/drawingml/2006/main" xmlns:r="http://schemas.openxmlformats.org/officeDocument/2006/relationships" xmlns:p="http://schemas.openxmlformats.org/presentationml/2006/main">
   <p:cSld>
     <p:bg>
@@ -5747,6 +6322,7 @@
       <p:pic>
         <p:nvPicPr>
           <p:cNvPr id="25" name="5" descr="Logo&#10;&#10;Description automatically generated">
+            <a:hlinkClick r:id="rId7"/>
             <a:extLst>
               <a:ext uri="{FF2B5EF4-FFF2-40B4-BE49-F238E27FC236}">
                 <a16:creationId xmlns:a16="http://schemas.microsoft.com/office/drawing/2014/main" id="{62BEFFA6-A638-489D-9C8E-7C78FEBF3E9E}"/>
@@ -5759,7 +6335,7 @@
           <p:nvPr/>
         </p:nvPicPr>
         <p:blipFill>
-          <a:blip r:embed="rId7">
+          <a:blip r:embed="rId8">
             <a:extLst>
               <a:ext uri="{28A0092B-C50C-407E-A947-70E740481C1C}">
                 <a14:useLocalDpi xmlns:a14="http://schemas.microsoft.com/office/drawing/2010/main" val="0"/>
@@ -5795,7 +6371,7 @@
           <p:nvPr/>
         </p:nvPicPr>
         <p:blipFill>
-          <a:blip r:embed="rId8">
+          <a:blip r:embed="rId9">
             <a:extLst>
               <a:ext uri="{28A0092B-C50C-407E-A947-70E740481C1C}">
                 <a14:useLocalDpi xmlns:a14="http://schemas.microsoft.com/office/drawing/2010/main" val="0"/>
@@ -6058,7 +6634,7 @@
 </p:sld>
 </file>
 
-<file path=ppt/slides/slide13.xml><?xml version="1.0" encoding="utf-8"?>
+<file path=ppt/slides/slide14.xml><?xml version="1.0" encoding="utf-8"?>
 <p:sld xmlns:a="http://schemas.openxmlformats.org/drawingml/2006/main" xmlns:r="http://schemas.openxmlformats.org/officeDocument/2006/relationships" xmlns:p="http://schemas.openxmlformats.org/presentationml/2006/main">
   <p:cSld>
     <p:bg>
@@ -6784,7 +7360,7 @@
 </p:sld>
 </file>
 
-<file path=ppt/slides/slide14.xml><?xml version="1.0" encoding="utf-8"?>
+<file path=ppt/slides/slide15.xml><?xml version="1.0" encoding="utf-8"?>
 <p:sld xmlns:a="http://schemas.openxmlformats.org/drawingml/2006/main" xmlns:r="http://schemas.openxmlformats.org/officeDocument/2006/relationships" xmlns:p="http://schemas.openxmlformats.org/presentationml/2006/main">
   <p:cSld>
     <p:bg>
@@ -7386,6 +7962,7 @@
       <p:pic>
         <p:nvPicPr>
           <p:cNvPr id="27" name="6" descr="Logo, company name&#10;&#10;Description automatically generated">
+            <a:hlinkClick r:id="rId8"/>
             <a:extLst>
               <a:ext uri="{FF2B5EF4-FFF2-40B4-BE49-F238E27FC236}">
                 <a16:creationId xmlns:a16="http://schemas.microsoft.com/office/drawing/2014/main" id="{826B06EA-6A12-415B-B802-AE8C2740C159}"/>
@@ -7398,7 +7975,7 @@
           <p:nvPr/>
         </p:nvPicPr>
         <p:blipFill>
-          <a:blip r:embed="rId8">
+          <a:blip r:embed="rId9">
             <a:extLst>
               <a:ext uri="{28A0092B-C50C-407E-A947-70E740481C1C}">
                 <a14:useLocalDpi xmlns:a14="http://schemas.microsoft.com/office/drawing/2010/main" val="0"/>
@@ -7661,7 +8238,7 @@
 </p:sld>
 </file>
 
-<file path=ppt/slides/slide15.xml><?xml version="1.0" encoding="utf-8"?>
+<file path=ppt/slides/slide16.xml><?xml version="1.0" encoding="utf-8"?>
 <p:sld xmlns:a="http://schemas.openxmlformats.org/drawingml/2006/main" xmlns:r="http://schemas.openxmlformats.org/officeDocument/2006/relationships" xmlns:p="http://schemas.openxmlformats.org/presentationml/2006/main">
   <p:cSld>
     <p:bg>
@@ -8512,7 +9089,7 @@
 </p:sld>
 </file>
 
-<file path=ppt/slides/slide16.xml><?xml version="1.0" encoding="utf-8"?>
+<file path=ppt/slides/slide17.xml><?xml version="1.0" encoding="utf-8"?>
 <p:sld xmlns:a="http://schemas.openxmlformats.org/drawingml/2006/main" xmlns:r="http://schemas.openxmlformats.org/officeDocument/2006/relationships" xmlns:p="http://schemas.openxmlformats.org/presentationml/2006/main">
   <p:cSld>
     <p:bg>
@@ -9220,6 +9797,296 @@
 </file>
 
 <file path=ppt/slides/slide2.xml><?xml version="1.0" encoding="utf-8"?>
+<p:sld xmlns:a="http://schemas.openxmlformats.org/drawingml/2006/main" xmlns:r="http://schemas.openxmlformats.org/officeDocument/2006/relationships" xmlns:p="http://schemas.openxmlformats.org/presentationml/2006/main">
+  <p:cSld>
+    <p:bg>
+      <p:bgPr>
+        <a:solidFill>
+          <a:srgbClr val="21B1E6"/>
+        </a:solidFill>
+        <a:effectLst/>
+      </p:bgPr>
+    </p:bg>
+    <p:spTree>
+      <p:nvGrpSpPr>
+        <p:cNvPr id="1" name=""/>
+        <p:cNvGrpSpPr/>
+        <p:nvPr/>
+      </p:nvGrpSpPr>
+      <p:grpSpPr>
+        <a:xfrm>
+          <a:off x="0" y="0"/>
+          <a:ext cx="0" cy="0"/>
+          <a:chOff x="0" y="0"/>
+          <a:chExt cx="0" cy="0"/>
+        </a:xfrm>
+      </p:grpSpPr>
+      <p:grpSp>
+        <p:nvGrpSpPr>
+          <p:cNvPr id="2" name="Group 1">
+            <a:extLst>
+              <a:ext uri="{FF2B5EF4-FFF2-40B4-BE49-F238E27FC236}">
+                <a16:creationId xmlns:a16="http://schemas.microsoft.com/office/drawing/2014/main" id="{372AEFC9-C76F-4951-8C33-D6282A19B284}"/>
+              </a:ext>
+            </a:extLst>
+          </p:cNvPr>
+          <p:cNvGrpSpPr/>
+          <p:nvPr/>
+        </p:nvGrpSpPr>
+        <p:grpSpPr>
+          <a:xfrm>
+            <a:off x="1539350" y="1052547"/>
+            <a:ext cx="7196797" cy="3489617"/>
+            <a:chOff x="1539350" y="1052547"/>
+            <a:chExt cx="7196797" cy="3489617"/>
+          </a:xfrm>
+        </p:grpSpPr>
+        <p:sp>
+          <p:nvSpPr>
+            <p:cNvPr id="5" name="TextBox 4">
+              <a:extLst>
+                <a:ext uri="{FF2B5EF4-FFF2-40B4-BE49-F238E27FC236}">
+                  <a16:creationId xmlns:a16="http://schemas.microsoft.com/office/drawing/2014/main" id="{E2A732E4-9415-4350-98FE-AB18C15E7483}"/>
+                </a:ext>
+              </a:extLst>
+            </p:cNvPr>
+            <p:cNvSpPr txBox="1"/>
+            <p:nvPr/>
+          </p:nvSpPr>
+          <p:spPr>
+            <a:xfrm>
+              <a:off x="1539350" y="1052547"/>
+              <a:ext cx="3651022" cy="1200329"/>
+            </a:xfrm>
+            <a:prstGeom prst="rect">
+              <a:avLst/>
+            </a:prstGeom>
+            <a:noFill/>
+          </p:spPr>
+          <p:txBody>
+            <a:bodyPr wrap="square" rtlCol="0">
+              <a:spAutoFit/>
+            </a:bodyPr>
+            <a:lstStyle/>
+            <a:p>
+              <a:r>
+                <a:rPr lang="en-US" sz="7200" dirty="0">
+                  <a:solidFill>
+                    <a:schemeClr val="bg1"/>
+                  </a:solidFill>
+                  <a:latin typeface="Avenir Next LT Pro" panose="020B0604020202020204" pitchFamily="34" charset="0"/>
+                </a:rPr>
+                <a:t>Gender</a:t>
+              </a:r>
+            </a:p>
+          </p:txBody>
+        </p:sp>
+        <p:sp>
+          <p:nvSpPr>
+            <p:cNvPr id="8" name="TextBox 7">
+              <a:extLst>
+                <a:ext uri="{FF2B5EF4-FFF2-40B4-BE49-F238E27FC236}">
+                  <a16:creationId xmlns:a16="http://schemas.microsoft.com/office/drawing/2014/main" id="{A2ED7554-CA81-4921-8FE1-AB228C04C8A2}"/>
+                </a:ext>
+              </a:extLst>
+            </p:cNvPr>
+            <p:cNvSpPr txBox="1"/>
+            <p:nvPr/>
+          </p:nvSpPr>
+          <p:spPr>
+            <a:xfrm>
+              <a:off x="4414127" y="3341835"/>
+              <a:ext cx="4322020" cy="1200329"/>
+            </a:xfrm>
+            <a:prstGeom prst="rect">
+              <a:avLst/>
+            </a:prstGeom>
+            <a:noFill/>
+          </p:spPr>
+          <p:txBody>
+            <a:bodyPr wrap="square" rtlCol="0">
+              <a:spAutoFit/>
+            </a:bodyPr>
+            <a:lstStyle/>
+            <a:p>
+              <a:r>
+                <a:rPr lang="en-US" sz="7200" dirty="0">
+                  <a:solidFill>
+                    <a:srgbClr val="D445E6"/>
+                  </a:solidFill>
+                  <a:latin typeface="Avenir Next LT Pro" panose="020B0604020202020204" pitchFamily="34" charset="0"/>
+                </a:rPr>
+                <a:t>S</a:t>
+              </a:r>
+              <a:r>
+                <a:rPr lang="en-US" sz="7200" dirty="0">
+                  <a:solidFill>
+                    <a:schemeClr val="bg1"/>
+                  </a:solidFill>
+                  <a:latin typeface="Avenir Next LT Pro" panose="020B0604020202020204" pitchFamily="34" charset="0"/>
+                </a:rPr>
+                <a:t>p</a:t>
+              </a:r>
+              <a:r>
+                <a:rPr lang="en-US" sz="7200" dirty="0">
+                  <a:solidFill>
+                    <a:srgbClr val="E68417"/>
+                  </a:solidFill>
+                  <a:latin typeface="Avenir Next LT Pro" panose="020B0604020202020204" pitchFamily="34" charset="0"/>
+                </a:rPr>
+                <a:t>e</a:t>
+              </a:r>
+              <a:r>
+                <a:rPr lang="en-US" sz="7200" dirty="0">
+                  <a:solidFill>
+                    <a:schemeClr val="bg1"/>
+                  </a:solidFill>
+                  <a:latin typeface="Avenir Next LT Pro" panose="020B0604020202020204" pitchFamily="34" charset="0"/>
+                </a:rPr>
+                <a:t>c</a:t>
+              </a:r>
+              <a:r>
+                <a:rPr lang="en-US" sz="7200" dirty="0">
+                  <a:solidFill>
+                    <a:srgbClr val="81E622"/>
+                  </a:solidFill>
+                  <a:latin typeface="Avenir Next LT Pro" panose="020B0604020202020204" pitchFamily="34" charset="0"/>
+                </a:rPr>
+                <a:t>t</a:t>
+              </a:r>
+              <a:r>
+                <a:rPr lang="en-US" sz="7200" dirty="0">
+                  <a:solidFill>
+                    <a:schemeClr val="bg1"/>
+                  </a:solidFill>
+                  <a:latin typeface="Avenir Next LT Pro" panose="020B0604020202020204" pitchFamily="34" charset="0"/>
+                </a:rPr>
+                <a:t>r</a:t>
+              </a:r>
+              <a:r>
+                <a:rPr lang="en-US" sz="7200" dirty="0">
+                  <a:solidFill>
+                    <a:srgbClr val="5BCEFA"/>
+                  </a:solidFill>
+                  <a:latin typeface="Avenir Next LT Pro" panose="020B0604020202020204" pitchFamily="34" charset="0"/>
+                </a:rPr>
+                <a:t>u</a:t>
+              </a:r>
+              <a:r>
+                <a:rPr lang="en-US" sz="7200" dirty="0">
+                  <a:solidFill>
+                    <a:schemeClr val="bg1"/>
+                  </a:solidFill>
+                  <a:latin typeface="Avenir Next LT Pro" panose="020B0604020202020204" pitchFamily="34" charset="0"/>
+                </a:rPr>
+                <a:t>m</a:t>
+              </a:r>
+            </a:p>
+          </p:txBody>
+        </p:sp>
+      </p:grpSp>
+    </p:spTree>
+    <p:extLst>
+      <p:ext uri="{BB962C8B-B14F-4D97-AF65-F5344CB8AC3E}">
+        <p14:creationId xmlns:p14="http://schemas.microsoft.com/office/powerpoint/2010/main" val="875177969"/>
+      </p:ext>
+    </p:extLst>
+  </p:cSld>
+  <p:clrMapOvr>
+    <a:masterClrMapping/>
+  </p:clrMapOvr>
+  <p:timing>
+    <p:tnLst>
+      <p:par>
+        <p:cTn id="1" dur="indefinite" restart="never" nodeType="tmRoot">
+          <p:childTnLst>
+            <p:seq concurrent="1" nextAc="seek">
+              <p:cTn id="2" dur="indefinite" nodeType="mainSeq">
+                <p:childTnLst>
+                  <p:par>
+                    <p:cTn id="3" fill="hold">
+                      <p:stCondLst>
+                        <p:cond delay="indefinite"/>
+                      </p:stCondLst>
+                      <p:childTnLst>
+                        <p:par>
+                          <p:cTn id="4" fill="hold">
+                            <p:stCondLst>
+                              <p:cond delay="0"/>
+                            </p:stCondLst>
+                            <p:childTnLst>
+                              <p:par>
+                                <p:cTn id="5" presetID="6" presetClass="emph" presetSubtype="0" fill="hold" nodeType="clickEffect">
+                                  <p:stCondLst>
+                                    <p:cond delay="0"/>
+                                  </p:stCondLst>
+                                  <p:childTnLst>
+                                    <p:animScale>
+                                      <p:cBhvr>
+                                        <p:cTn id="6" dur="2000" fill="hold"/>
+                                        <p:tgtEl>
+                                          <p:spTgt spid="2"/>
+                                        </p:tgtEl>
+                                      </p:cBhvr>
+                                      <p:by x="40000" y="40000"/>
+                                    </p:animScale>
+                                  </p:childTnLst>
+                                </p:cTn>
+                              </p:par>
+                              <p:par>
+                                <p:cTn id="7" presetID="35" presetClass="path" presetSubtype="0" accel="50000" decel="50000" fill="hold" nodeType="withEffect">
+                                  <p:stCondLst>
+                                    <p:cond delay="0"/>
+                                  </p:stCondLst>
+                                  <p:childTnLst>
+                                    <p:animMotion origin="layout" path="M 0.03568 -0.05579 L -0.35169 -0.40787 " pathEditMode="relative" rAng="0" ptsTypes="AA">
+                                      <p:cBhvr>
+                                        <p:cTn id="8" dur="2000" fill="hold"/>
+                                        <p:tgtEl>
+                                          <p:spTgt spid="2"/>
+                                        </p:tgtEl>
+                                        <p:attrNameLst>
+                                          <p:attrName>ppt_x</p:attrName>
+                                          <p:attrName>ppt_y</p:attrName>
+                                        </p:attrNameLst>
+                                      </p:cBhvr>
+                                      <p:rCtr x="-19375" y="-17616"/>
+                                    </p:animMotion>
+                                  </p:childTnLst>
+                                </p:cTn>
+                              </p:par>
+                            </p:childTnLst>
+                          </p:cTn>
+                        </p:par>
+                      </p:childTnLst>
+                    </p:cTn>
+                  </p:par>
+                </p:childTnLst>
+              </p:cTn>
+              <p:prevCondLst>
+                <p:cond evt="onPrev" delay="0">
+                  <p:tgtEl>
+                    <p:sldTgt/>
+                  </p:tgtEl>
+                </p:cond>
+              </p:prevCondLst>
+              <p:nextCondLst>
+                <p:cond evt="onNext" delay="0">
+                  <p:tgtEl>
+                    <p:sldTgt/>
+                  </p:tgtEl>
+                </p:cond>
+              </p:nextCondLst>
+            </p:seq>
+          </p:childTnLst>
+        </p:cTn>
+      </p:par>
+    </p:tnLst>
+  </p:timing>
+</p:sld>
+</file>
+
+<file path=ppt/slides/slide3.xml><?xml version="1.0" encoding="utf-8"?>
 <p:sld xmlns:a="http://schemas.openxmlformats.org/drawingml/2006/main" xmlns:r="http://schemas.openxmlformats.org/officeDocument/2006/relationships" xmlns:p="http://schemas.openxmlformats.org/presentationml/2006/main" show="0">
   <p:cSld>
     <p:bg>
@@ -10460,7 +11327,7 @@
 </p:sld>
 </file>
 
-<file path=ppt/slides/slide3.xml><?xml version="1.0" encoding="utf-8"?>
+<file path=ppt/slides/slide4.xml><?xml version="1.0" encoding="utf-8"?>
 <p:sld xmlns:a="http://schemas.openxmlformats.org/drawingml/2006/main" xmlns:r="http://schemas.openxmlformats.org/officeDocument/2006/relationships" xmlns:p="http://schemas.openxmlformats.org/presentationml/2006/main">
   <p:cSld>
     <p:bg>
@@ -10882,6 +11749,7 @@
       <p:pic>
         <p:nvPicPr>
           <p:cNvPr id="3" name="1" descr="Shape&#10;&#10;Description automatically generated with medium confidence">
+            <a:hlinkClick r:id="rId3"/>
             <a:extLst>
               <a:ext uri="{FF2B5EF4-FFF2-40B4-BE49-F238E27FC236}">
                 <a16:creationId xmlns:a16="http://schemas.microsoft.com/office/drawing/2014/main" id="{C9D2FC1B-D382-474A-8B4A-B405485B1C60}"/>
@@ -10894,7 +11762,7 @@
           <p:nvPr/>
         </p:nvPicPr>
         <p:blipFill>
-          <a:blip r:embed="rId3">
+          <a:blip r:embed="rId4">
             <a:extLst>
               <a:ext uri="{28A0092B-C50C-407E-A947-70E740481C1C}">
                 <a14:useLocalDpi xmlns:a14="http://schemas.microsoft.com/office/drawing/2010/main" val="0"/>
@@ -10930,7 +11798,7 @@
           <p:nvPr/>
         </p:nvPicPr>
         <p:blipFill>
-          <a:blip r:embed="rId4">
+          <a:blip r:embed="rId5">
             <a:extLst>
               <a:ext uri="{28A0092B-C50C-407E-A947-70E740481C1C}">
                 <a14:useLocalDpi xmlns:a14="http://schemas.microsoft.com/office/drawing/2010/main" val="0"/>
@@ -10966,7 +11834,7 @@
           <p:nvPr/>
         </p:nvPicPr>
         <p:blipFill>
-          <a:blip r:embed="rId5">
+          <a:blip r:embed="rId6">
             <a:extLst>
               <a:ext uri="{28A0092B-C50C-407E-A947-70E740481C1C}">
                 <a14:useLocalDpi xmlns:a14="http://schemas.microsoft.com/office/drawing/2010/main" val="0"/>
@@ -11002,7 +11870,7 @@
           <p:nvPr/>
         </p:nvPicPr>
         <p:blipFill>
-          <a:blip r:embed="rId6">
+          <a:blip r:embed="rId7">
             <a:extLst>
               <a:ext uri="{28A0092B-C50C-407E-A947-70E740481C1C}">
                 <a14:useLocalDpi xmlns:a14="http://schemas.microsoft.com/office/drawing/2010/main" val="0"/>
@@ -11038,7 +11906,7 @@
           <p:nvPr/>
         </p:nvPicPr>
         <p:blipFill>
-          <a:blip r:embed="rId7">
+          <a:blip r:embed="rId8">
             <a:extLst>
               <a:ext uri="{28A0092B-C50C-407E-A947-70E740481C1C}">
                 <a14:useLocalDpi xmlns:a14="http://schemas.microsoft.com/office/drawing/2010/main" val="0"/>
@@ -11074,7 +11942,7 @@
           <p:nvPr/>
         </p:nvPicPr>
         <p:blipFill>
-          <a:blip r:embed="rId8">
+          <a:blip r:embed="rId9">
             <a:extLst>
               <a:ext uri="{28A0092B-C50C-407E-A947-70E740481C1C}">
                 <a14:useLocalDpi xmlns:a14="http://schemas.microsoft.com/office/drawing/2010/main" val="0"/>
@@ -11771,7 +12639,7 @@
 </p:sld>
 </file>
 
-<file path=ppt/slides/slide4.xml><?xml version="1.0" encoding="utf-8"?>
+<file path=ppt/slides/slide5.xml><?xml version="1.0" encoding="utf-8"?>
 <p:sld xmlns:a="http://schemas.openxmlformats.org/drawingml/2006/main" xmlns:r="http://schemas.openxmlformats.org/officeDocument/2006/relationships" xmlns:p="http://schemas.openxmlformats.org/presentationml/2006/main" show="0">
   <p:cSld>
     <p:bg>
@@ -12541,7 +13409,7 @@
 </p:sld>
 </file>
 
-<file path=ppt/slides/slide5.xml><?xml version="1.0" encoding="utf-8"?>
+<file path=ppt/slides/slide6.xml><?xml version="1.0" encoding="utf-8"?>
 <p:sld xmlns:a="http://schemas.openxmlformats.org/drawingml/2006/main" xmlns:r="http://schemas.openxmlformats.org/officeDocument/2006/relationships" xmlns:p="http://schemas.openxmlformats.org/presentationml/2006/main">
   <p:cSld>
     <p:bg>
@@ -12979,7 +13847,7 @@
 </p:sld>
 </file>
 
-<file path=ppt/slides/slide6.xml><?xml version="1.0" encoding="utf-8"?>
+<file path=ppt/slides/slide7.xml><?xml version="1.0" encoding="utf-8"?>
 <p:sld xmlns:a="http://schemas.openxmlformats.org/drawingml/2006/main" xmlns:r="http://schemas.openxmlformats.org/officeDocument/2006/relationships" xmlns:p="http://schemas.openxmlformats.org/presentationml/2006/main">
   <p:cSld>
     <p:bg>
@@ -13437,6 +14305,7 @@
       <p:pic>
         <p:nvPicPr>
           <p:cNvPr id="5" name="2" descr="Logo, company name&#10;&#10;Description automatically generated">
+            <a:hlinkClick r:id="rId4"/>
             <a:extLst>
               <a:ext uri="{FF2B5EF4-FFF2-40B4-BE49-F238E27FC236}">
                 <a16:creationId xmlns:a16="http://schemas.microsoft.com/office/drawing/2014/main" id="{3F09115C-70D4-4A6F-ABAE-B8E52041CDF7}"/>
@@ -13449,7 +14318,7 @@
           <p:nvPr/>
         </p:nvPicPr>
         <p:blipFill>
-          <a:blip r:embed="rId4">
+          <a:blip r:embed="rId5">
             <a:extLst>
               <a:ext uri="{28A0092B-C50C-407E-A947-70E740481C1C}">
                 <a14:useLocalDpi xmlns:a14="http://schemas.microsoft.com/office/drawing/2010/main" val="0"/>
@@ -13485,7 +14354,7 @@
           <p:nvPr/>
         </p:nvPicPr>
         <p:blipFill>
-          <a:blip r:embed="rId5">
+          <a:blip r:embed="rId6">
             <a:extLst>
               <a:ext uri="{28A0092B-C50C-407E-A947-70E740481C1C}">
                 <a14:useLocalDpi xmlns:a14="http://schemas.microsoft.com/office/drawing/2010/main" val="0"/>
@@ -13521,7 +14390,7 @@
           <p:nvPr/>
         </p:nvPicPr>
         <p:blipFill>
-          <a:blip r:embed="rId6">
+          <a:blip r:embed="rId7">
             <a:extLst>
               <a:ext uri="{28A0092B-C50C-407E-A947-70E740481C1C}">
                 <a14:useLocalDpi xmlns:a14="http://schemas.microsoft.com/office/drawing/2010/main" val="0"/>
@@ -13557,7 +14426,7 @@
           <p:nvPr/>
         </p:nvPicPr>
         <p:blipFill>
-          <a:blip r:embed="rId7">
+          <a:blip r:embed="rId8">
             <a:extLst>
               <a:ext uri="{28A0092B-C50C-407E-A947-70E740481C1C}">
                 <a14:useLocalDpi xmlns:a14="http://schemas.microsoft.com/office/drawing/2010/main" val="0"/>
@@ -13593,7 +14462,7 @@
           <p:nvPr/>
         </p:nvPicPr>
         <p:blipFill>
-          <a:blip r:embed="rId8">
+          <a:blip r:embed="rId9">
             <a:extLst>
               <a:ext uri="{28A0092B-C50C-407E-A947-70E740481C1C}">
                 <a14:useLocalDpi xmlns:a14="http://schemas.microsoft.com/office/drawing/2010/main" val="0"/>
@@ -13856,7 +14725,7 @@
 </p:sld>
 </file>
 
-<file path=ppt/slides/slide7.xml><?xml version="1.0" encoding="utf-8"?>
+<file path=ppt/slides/slide8.xml><?xml version="1.0" encoding="utf-8"?>
 <p:sld xmlns:a="http://schemas.openxmlformats.org/drawingml/2006/main" xmlns:r="http://schemas.openxmlformats.org/officeDocument/2006/relationships" xmlns:p="http://schemas.openxmlformats.org/presentationml/2006/main">
   <p:cSld>
     <p:bg>
@@ -14686,7 +15555,7 @@
 </p:sld>
 </file>
 
-<file path=ppt/slides/slide8.xml><?xml version="1.0" encoding="utf-8"?>
+<file path=ppt/slides/slide9.xml><?xml version="1.0" encoding="utf-8"?>
 <p:sld xmlns:a="http://schemas.openxmlformats.org/drawingml/2006/main" xmlns:r="http://schemas.openxmlformats.org/officeDocument/2006/relationships" xmlns:p="http://schemas.openxmlformats.org/presentationml/2006/main">
   <p:cSld>
     <p:bg>
@@ -15180,6 +16049,7 @@
       <p:pic>
         <p:nvPicPr>
           <p:cNvPr id="7" name="3" descr="Logo&#10;&#10;Description automatically generated">
+            <a:hlinkClick r:id="rId5"/>
             <a:extLst>
               <a:ext uri="{FF2B5EF4-FFF2-40B4-BE49-F238E27FC236}">
                 <a16:creationId xmlns:a16="http://schemas.microsoft.com/office/drawing/2014/main" id="{4486E2FA-DDD7-43E3-95A4-C54DB76CD693}"/>
@@ -15192,7 +16062,7 @@
           <p:nvPr/>
         </p:nvPicPr>
         <p:blipFill>
-          <a:blip r:embed="rId5">
+          <a:blip r:embed="rId6">
             <a:extLst>
               <a:ext uri="{28A0092B-C50C-407E-A947-70E740481C1C}">
                 <a14:useLocalDpi xmlns:a14="http://schemas.microsoft.com/office/drawing/2010/main" val="0"/>
@@ -15228,7 +16098,7 @@
           <p:nvPr/>
         </p:nvPicPr>
         <p:blipFill>
-          <a:blip r:embed="rId6">
+          <a:blip r:embed="rId7">
             <a:extLst>
               <a:ext uri="{28A0092B-C50C-407E-A947-70E740481C1C}">
                 <a14:useLocalDpi xmlns:a14="http://schemas.microsoft.com/office/drawing/2010/main" val="0"/>
@@ -15264,7 +16134,7 @@
           <p:nvPr/>
         </p:nvPicPr>
         <p:blipFill>
-          <a:blip r:embed="rId7">
+          <a:blip r:embed="rId8">
             <a:extLst>
               <a:ext uri="{28A0092B-C50C-407E-A947-70E740481C1C}">
                 <a14:useLocalDpi xmlns:a14="http://schemas.microsoft.com/office/drawing/2010/main" val="0"/>
@@ -15300,7 +16170,7 @@
           <p:nvPr/>
         </p:nvPicPr>
         <p:blipFill>
-          <a:blip r:embed="rId8">
+          <a:blip r:embed="rId9">
             <a:extLst>
               <a:ext uri="{28A0092B-C50C-407E-A947-70E740481C1C}">
                 <a14:useLocalDpi xmlns:a14="http://schemas.microsoft.com/office/drawing/2010/main" val="0"/>
@@ -15559,660 +16429,6 @@
       <p:bldP spid="28" grpId="0" animBg="1"/>
       <p:bldP spid="18" grpId="0" animBg="1"/>
     </p:bldLst>
-  </p:timing>
-</p:sld>
-</file>
-
-<file path=ppt/slides/slide9.xml><?xml version="1.0" encoding="utf-8"?>
-<p:sld xmlns:a="http://schemas.openxmlformats.org/drawingml/2006/main" xmlns:r="http://schemas.openxmlformats.org/officeDocument/2006/relationships" xmlns:p="http://schemas.openxmlformats.org/presentationml/2006/main">
-  <p:cSld>
-    <p:bg>
-      <p:bgPr>
-        <a:solidFill>
-          <a:srgbClr val="21B1E6"/>
-        </a:solidFill>
-        <a:effectLst/>
-      </p:bgPr>
-    </p:bg>
-    <p:spTree>
-      <p:nvGrpSpPr>
-        <p:cNvPr id="1" name=""/>
-        <p:cNvGrpSpPr/>
-        <p:nvPr/>
-      </p:nvGrpSpPr>
-      <p:grpSpPr>
-        <a:xfrm>
-          <a:off x="0" y="0"/>
-          <a:ext cx="0" cy="0"/>
-          <a:chOff x="0" y="0"/>
-          <a:chExt cx="0" cy="0"/>
-        </a:xfrm>
-      </p:grpSpPr>
-      <p:pic>
-        <p:nvPicPr>
-          <p:cNvPr id="4" name="Picture 3">
-            <a:extLst>
-              <a:ext uri="{FF2B5EF4-FFF2-40B4-BE49-F238E27FC236}">
-                <a16:creationId xmlns:a16="http://schemas.microsoft.com/office/drawing/2014/main" id="{B50AEBF2-69A9-4306-BCA1-2F0074CB863E}"/>
-              </a:ext>
-            </a:extLst>
-          </p:cNvPr>
-          <p:cNvPicPr>
-            <a:picLocks noChangeAspect="1"/>
-          </p:cNvPicPr>
-          <p:nvPr/>
-        </p:nvPicPr>
-        <p:blipFill>
-          <a:blip r:embed="rId2"/>
-          <a:stretch>
-            <a:fillRect/>
-          </a:stretch>
-        </p:blipFill>
-        <p:spPr>
-          <a:xfrm>
-            <a:off x="0" y="0"/>
-            <a:ext cx="12192000" cy="6858000"/>
-          </a:xfrm>
-          <a:prstGeom prst="rect">
-            <a:avLst/>
-          </a:prstGeom>
-        </p:spPr>
-      </p:pic>
-      <p:sp>
-        <p:nvSpPr>
-          <p:cNvPr id="9" name="Rectangle: Rounded Corners 8">
-            <a:extLst>
-              <a:ext uri="{FF2B5EF4-FFF2-40B4-BE49-F238E27FC236}">
-                <a16:creationId xmlns:a16="http://schemas.microsoft.com/office/drawing/2014/main" id="{CBA9F85D-2E7C-4513-A504-B2432B4D1723}"/>
-              </a:ext>
-            </a:extLst>
-          </p:cNvPr>
-          <p:cNvSpPr/>
-          <p:nvPr/>
-        </p:nvSpPr>
-        <p:spPr>
-          <a:xfrm>
-            <a:off x="561521" y="881814"/>
-            <a:ext cx="236593" cy="234292"/>
-          </a:xfrm>
-          <a:prstGeom prst="roundRect">
-            <a:avLst/>
-          </a:prstGeom>
-          <a:solidFill>
-            <a:srgbClr val="E68417"/>
-          </a:solidFill>
-          <a:ln>
-            <a:noFill/>
-          </a:ln>
-        </p:spPr>
-        <p:style>
-          <a:lnRef idx="2">
-            <a:schemeClr val="accent1">
-              <a:shade val="50000"/>
-            </a:schemeClr>
-          </a:lnRef>
-          <a:fillRef idx="1">
-            <a:schemeClr val="accent1"/>
-          </a:fillRef>
-          <a:effectRef idx="0">
-            <a:schemeClr val="accent1"/>
-          </a:effectRef>
-          <a:fontRef idx="minor">
-            <a:schemeClr val="lt1"/>
-          </a:fontRef>
-        </p:style>
-        <p:txBody>
-          <a:bodyPr rtlCol="0" anchor="ctr"/>
-          <a:lstStyle/>
-          <a:p>
-            <a:pPr algn="ctr"/>
-            <a:endParaRPr lang="en-US"/>
-          </a:p>
-        </p:txBody>
-      </p:sp>
-      <p:sp>
-        <p:nvSpPr>
-          <p:cNvPr id="2" name="TextBox 1">
-            <a:extLst>
-              <a:ext uri="{FF2B5EF4-FFF2-40B4-BE49-F238E27FC236}">
-                <a16:creationId xmlns:a16="http://schemas.microsoft.com/office/drawing/2014/main" id="{B28EEF6C-89EF-4DEC-8D65-E3DF9800F127}"/>
-              </a:ext>
-            </a:extLst>
-          </p:cNvPr>
-          <p:cNvSpPr txBox="1"/>
-          <p:nvPr/>
-        </p:nvSpPr>
-        <p:spPr>
-          <a:xfrm>
-            <a:off x="463924" y="235323"/>
-            <a:ext cx="2649070" cy="584775"/>
-          </a:xfrm>
-          <a:prstGeom prst="rect">
-            <a:avLst/>
-          </a:prstGeom>
-          <a:noFill/>
-        </p:spPr>
-        <p:txBody>
-          <a:bodyPr wrap="square" rtlCol="0">
-            <a:spAutoFit/>
-          </a:bodyPr>
-          <a:lstStyle/>
-          <a:p>
-            <a:pPr algn="l"/>
-            <a:r>
-              <a:rPr lang="en-US" sz="3200" dirty="0">
-                <a:solidFill>
-                  <a:srgbClr val="D445E6"/>
-                </a:solidFill>
-                <a:highlight>
-                  <a:srgbClr val="21B1E6"/>
-                </a:highlight>
-                <a:latin typeface="Avenir Next LT Pro" panose="020B0604020202020204" pitchFamily="34" charset="0"/>
-              </a:rPr>
-              <a:t>N</a:t>
-            </a:r>
-            <a:r>
-              <a:rPr lang="en-US" sz="3200" dirty="0">
-                <a:solidFill>
-                  <a:schemeClr val="bg1"/>
-                </a:solidFill>
-                <a:highlight>
-                  <a:srgbClr val="21B1E6"/>
-                </a:highlight>
-                <a:latin typeface="Avenir Next LT Pro" panose="020B0604020202020204" pitchFamily="34" charset="0"/>
-              </a:rPr>
-              <a:t>o</a:t>
-            </a:r>
-            <a:r>
-              <a:rPr lang="en-US" sz="3200" dirty="0">
-                <a:solidFill>
-                  <a:srgbClr val="81E622"/>
-                </a:solidFill>
-                <a:highlight>
-                  <a:srgbClr val="21B1E6"/>
-                </a:highlight>
-                <a:latin typeface="Avenir Next LT Pro" panose="020B0604020202020204" pitchFamily="34" charset="0"/>
-              </a:rPr>
-              <a:t>t</a:t>
-            </a:r>
-            <a:r>
-              <a:rPr lang="en-US" sz="3200" dirty="0">
-                <a:solidFill>
-                  <a:schemeClr val="bg1"/>
-                </a:solidFill>
-                <a:highlight>
-                  <a:srgbClr val="21B1E6"/>
-                </a:highlight>
-                <a:latin typeface="Avenir Next LT Pro" panose="020B0604020202020204" pitchFamily="34" charset="0"/>
-              </a:rPr>
-              <a:t>e</a:t>
-            </a:r>
-            <a:r>
-              <a:rPr lang="en-US" sz="3200" dirty="0">
-                <a:solidFill>
-                  <a:srgbClr val="E68417"/>
-                </a:solidFill>
-                <a:highlight>
-                  <a:srgbClr val="21B1E6"/>
-                </a:highlight>
-                <a:latin typeface="Avenir Next LT Pro" panose="020B0604020202020204" pitchFamily="34" charset="0"/>
-              </a:rPr>
-              <a:t>s</a:t>
-            </a:r>
-          </a:p>
-        </p:txBody>
-      </p:sp>
-      <p:sp>
-        <p:nvSpPr>
-          <p:cNvPr id="3" name="Rectangle 2">
-            <a:extLst>
-              <a:ext uri="{FF2B5EF4-FFF2-40B4-BE49-F238E27FC236}">
-                <a16:creationId xmlns:a16="http://schemas.microsoft.com/office/drawing/2014/main" id="{1B978686-3627-499D-B7FC-70B0A0A2344C}"/>
-              </a:ext>
-            </a:extLst>
-          </p:cNvPr>
-          <p:cNvSpPr/>
-          <p:nvPr/>
-        </p:nvSpPr>
-        <p:spPr>
-          <a:xfrm>
-            <a:off x="1667434" y="295831"/>
-            <a:ext cx="658906" cy="457027"/>
-          </a:xfrm>
-          <a:prstGeom prst="rect">
-            <a:avLst/>
-          </a:prstGeom>
-          <a:solidFill>
-            <a:srgbClr val="21B1E6"/>
-          </a:solidFill>
-          <a:ln>
-            <a:noFill/>
-          </a:ln>
-        </p:spPr>
-        <p:style>
-          <a:lnRef idx="2">
-            <a:schemeClr val="accent1">
-              <a:shade val="50000"/>
-            </a:schemeClr>
-          </a:lnRef>
-          <a:fillRef idx="1">
-            <a:schemeClr val="accent1"/>
-          </a:fillRef>
-          <a:effectRef idx="0">
-            <a:schemeClr val="accent1"/>
-          </a:effectRef>
-          <a:fontRef idx="minor">
-            <a:schemeClr val="lt1"/>
-          </a:fontRef>
-        </p:style>
-        <p:txBody>
-          <a:bodyPr rtlCol="0" anchor="ctr"/>
-          <a:lstStyle/>
-          <a:p>
-            <a:pPr algn="ctr"/>
-            <a:endParaRPr lang="en-US"/>
-          </a:p>
-        </p:txBody>
-      </p:sp>
-      <p:sp>
-        <p:nvSpPr>
-          <p:cNvPr id="23" name="Rectangle: Rounded Corners 22">
-            <a:extLst>
-              <a:ext uri="{FF2B5EF4-FFF2-40B4-BE49-F238E27FC236}">
-                <a16:creationId xmlns:a16="http://schemas.microsoft.com/office/drawing/2014/main" id="{7788500E-33FF-4980-A5B8-BEA772A4CEB5}"/>
-              </a:ext>
-            </a:extLst>
-          </p:cNvPr>
-          <p:cNvSpPr/>
-          <p:nvPr/>
-        </p:nvSpPr>
-        <p:spPr>
-          <a:xfrm>
-            <a:off x="561520" y="-5929088"/>
-            <a:ext cx="236593" cy="6093868"/>
-          </a:xfrm>
-          <a:prstGeom prst="roundRect">
-            <a:avLst/>
-          </a:prstGeom>
-          <a:solidFill>
-            <a:srgbClr val="E68417"/>
-          </a:solidFill>
-          <a:ln>
-            <a:noFill/>
-          </a:ln>
-        </p:spPr>
-        <p:style>
-          <a:lnRef idx="2">
-            <a:schemeClr val="accent1">
-              <a:shade val="50000"/>
-            </a:schemeClr>
-          </a:lnRef>
-          <a:fillRef idx="1">
-            <a:schemeClr val="accent1"/>
-          </a:fillRef>
-          <a:effectRef idx="0">
-            <a:schemeClr val="accent1"/>
-          </a:effectRef>
-          <a:fontRef idx="minor">
-            <a:schemeClr val="lt1"/>
-          </a:fontRef>
-        </p:style>
-        <p:txBody>
-          <a:bodyPr rtlCol="0" anchor="ctr"/>
-          <a:lstStyle/>
-          <a:p>
-            <a:pPr algn="ctr"/>
-            <a:endParaRPr lang="en-US"/>
-          </a:p>
-        </p:txBody>
-      </p:sp>
-      <p:pic>
-        <p:nvPicPr>
-          <p:cNvPr id="7" name="Picture 6" descr="Text&#10;&#10;Description automatically generated with low confidence">
-            <a:extLst>
-              <a:ext uri="{FF2B5EF4-FFF2-40B4-BE49-F238E27FC236}">
-                <a16:creationId xmlns:a16="http://schemas.microsoft.com/office/drawing/2014/main" id="{FD420DCE-D2BC-41BD-A64C-09FDEC3289CA}"/>
-              </a:ext>
-            </a:extLst>
-          </p:cNvPr>
-          <p:cNvPicPr>
-            <a:picLocks noChangeAspect="1"/>
-          </p:cNvPicPr>
-          <p:nvPr/>
-        </p:nvPicPr>
-        <p:blipFill>
-          <a:blip r:embed="rId3">
-            <a:extLst>
-              <a:ext uri="{28A0092B-C50C-407E-A947-70E740481C1C}">
-                <a14:useLocalDpi xmlns:a14="http://schemas.microsoft.com/office/drawing/2010/main" val="0"/>
-              </a:ext>
-            </a:extLst>
-          </a:blip>
-          <a:stretch>
-            <a:fillRect/>
-          </a:stretch>
-        </p:blipFill>
-        <p:spPr>
-          <a:xfrm>
-            <a:off x="773360" y="711788"/>
-            <a:ext cx="10956281" cy="856219"/>
-          </a:xfrm>
-          <a:prstGeom prst="rect">
-            <a:avLst/>
-          </a:prstGeom>
-        </p:spPr>
-      </p:pic>
-      <p:pic>
-        <p:nvPicPr>
-          <p:cNvPr id="11" name="320" descr="Text&#10;&#10;Description automatically generated">
-            <a:extLst>
-              <a:ext uri="{FF2B5EF4-FFF2-40B4-BE49-F238E27FC236}">
-                <a16:creationId xmlns:a16="http://schemas.microsoft.com/office/drawing/2014/main" id="{A485440D-1157-4425-A376-F2EF3F01EA31}"/>
-              </a:ext>
-            </a:extLst>
-          </p:cNvPr>
-          <p:cNvPicPr>
-            <a:picLocks noChangeAspect="1"/>
-          </p:cNvPicPr>
-          <p:nvPr/>
-        </p:nvPicPr>
-        <p:blipFill>
-          <a:blip r:embed="rId4">
-            <a:extLst>
-              <a:ext uri="{28A0092B-C50C-407E-A947-70E740481C1C}">
-                <a14:useLocalDpi xmlns:a14="http://schemas.microsoft.com/office/drawing/2010/main" val="0"/>
-              </a:ext>
-            </a:extLst>
-          </a:blip>
-          <a:stretch>
-            <a:fillRect/>
-          </a:stretch>
-        </p:blipFill>
-        <p:spPr>
-          <a:xfrm>
-            <a:off x="977210" y="1427436"/>
-            <a:ext cx="4896244" cy="856219"/>
-          </a:xfrm>
-          <a:prstGeom prst="rect">
-            <a:avLst/>
-          </a:prstGeom>
-        </p:spPr>
-      </p:pic>
-      <p:pic>
-        <p:nvPicPr>
-          <p:cNvPr id="21" name="321" descr="Text&#10;&#10;Description automatically generated">
-            <a:extLst>
-              <a:ext uri="{FF2B5EF4-FFF2-40B4-BE49-F238E27FC236}">
-                <a16:creationId xmlns:a16="http://schemas.microsoft.com/office/drawing/2014/main" id="{CEACCA46-C532-4D22-975A-AEE8F7F11C62}"/>
-              </a:ext>
-            </a:extLst>
-          </p:cNvPr>
-          <p:cNvPicPr>
-            <a:picLocks noChangeAspect="1"/>
-          </p:cNvPicPr>
-          <p:nvPr/>
-        </p:nvPicPr>
-        <p:blipFill>
-          <a:blip r:embed="rId5">
-            <a:extLst>
-              <a:ext uri="{28A0092B-C50C-407E-A947-70E740481C1C}">
-                <a14:useLocalDpi xmlns:a14="http://schemas.microsoft.com/office/drawing/2010/main" val="0"/>
-              </a:ext>
-            </a:extLst>
-          </a:blip>
-          <a:stretch>
-            <a:fillRect/>
-          </a:stretch>
-        </p:blipFill>
-        <p:spPr>
-          <a:xfrm>
-            <a:off x="977210" y="2123744"/>
-            <a:ext cx="4832512" cy="856219"/>
-          </a:xfrm>
-          <a:prstGeom prst="rect">
-            <a:avLst/>
-          </a:prstGeom>
-        </p:spPr>
-      </p:pic>
-      <p:pic>
-        <p:nvPicPr>
-          <p:cNvPr id="26" name="323" descr="Text&#10;&#10;Description automatically generated">
-            <a:extLst>
-              <a:ext uri="{FF2B5EF4-FFF2-40B4-BE49-F238E27FC236}">
-                <a16:creationId xmlns:a16="http://schemas.microsoft.com/office/drawing/2014/main" id="{6FD8C824-A002-46F4-8A0B-7CE8C6F30C65}"/>
-              </a:ext>
-            </a:extLst>
-          </p:cNvPr>
-          <p:cNvPicPr>
-            <a:picLocks noChangeAspect="1"/>
-          </p:cNvPicPr>
-          <p:nvPr/>
-        </p:nvPicPr>
-        <p:blipFill>
-          <a:blip r:embed="rId6">
-            <a:extLst>
-              <a:ext uri="{28A0092B-C50C-407E-A947-70E740481C1C}">
-                <a14:useLocalDpi xmlns:a14="http://schemas.microsoft.com/office/drawing/2010/main" val="0"/>
-              </a:ext>
-            </a:extLst>
-          </a:blip>
-          <a:stretch>
-            <a:fillRect/>
-          </a:stretch>
-        </p:blipFill>
-        <p:spPr>
-          <a:xfrm>
-            <a:off x="5946306" y="1427436"/>
-            <a:ext cx="2745998" cy="856219"/>
-          </a:xfrm>
-          <a:prstGeom prst="rect">
-            <a:avLst/>
-          </a:prstGeom>
-        </p:spPr>
-      </p:pic>
-      <p:pic>
-        <p:nvPicPr>
-          <p:cNvPr id="28" name="324" descr="Text&#10;&#10;Description automatically generated">
-            <a:extLst>
-              <a:ext uri="{FF2B5EF4-FFF2-40B4-BE49-F238E27FC236}">
-                <a16:creationId xmlns:a16="http://schemas.microsoft.com/office/drawing/2014/main" id="{374D56AC-E150-4742-ACFE-43083960B102}"/>
-              </a:ext>
-            </a:extLst>
-          </p:cNvPr>
-          <p:cNvPicPr>
-            <a:picLocks noChangeAspect="1"/>
-          </p:cNvPicPr>
-          <p:nvPr/>
-        </p:nvPicPr>
-        <p:blipFill>
-          <a:blip r:embed="rId7">
-            <a:extLst>
-              <a:ext uri="{28A0092B-C50C-407E-A947-70E740481C1C}">
-                <a14:useLocalDpi xmlns:a14="http://schemas.microsoft.com/office/drawing/2010/main" val="0"/>
-              </a:ext>
-            </a:extLst>
-          </a:blip>
-          <a:stretch>
-            <a:fillRect/>
-          </a:stretch>
-        </p:blipFill>
-        <p:spPr>
-          <a:xfrm>
-            <a:off x="8672721" y="1427436"/>
-            <a:ext cx="3314039" cy="856219"/>
-          </a:xfrm>
-          <a:prstGeom prst="rect">
-            <a:avLst/>
-          </a:prstGeom>
-        </p:spPr>
-      </p:pic>
-      <p:pic>
-        <p:nvPicPr>
-          <p:cNvPr id="30" name="df" descr="Text&#10;&#10;Description automatically generated">
-            <a:extLst>
-              <a:ext uri="{FF2B5EF4-FFF2-40B4-BE49-F238E27FC236}">
-                <a16:creationId xmlns:a16="http://schemas.microsoft.com/office/drawing/2014/main" id="{7CF033EE-174C-48AD-9291-8E3C5CD25113}"/>
-              </a:ext>
-            </a:extLst>
-          </p:cNvPr>
-          <p:cNvPicPr>
-            <a:picLocks noChangeAspect="1"/>
-          </p:cNvPicPr>
-          <p:nvPr/>
-        </p:nvPicPr>
-        <p:blipFill>
-          <a:blip r:embed="rId8">
-            <a:extLst>
-              <a:ext uri="{28A0092B-C50C-407E-A947-70E740481C1C}">
-                <a14:useLocalDpi xmlns:a14="http://schemas.microsoft.com/office/drawing/2010/main" val="0"/>
-              </a:ext>
-            </a:extLst>
-          </a:blip>
-          <a:stretch>
-            <a:fillRect/>
-          </a:stretch>
-        </p:blipFill>
-        <p:spPr>
-          <a:xfrm>
-            <a:off x="990816" y="2839346"/>
-            <a:ext cx="4333744" cy="856219"/>
-          </a:xfrm>
-          <a:prstGeom prst="rect">
-            <a:avLst/>
-          </a:prstGeom>
-        </p:spPr>
-      </p:pic>
-      <p:pic>
-        <p:nvPicPr>
-          <p:cNvPr id="6" name="Picture 5" descr="A picture containing text&#10;&#10;Description automatically generated">
-            <a:extLst>
-              <a:ext uri="{FF2B5EF4-FFF2-40B4-BE49-F238E27FC236}">
-                <a16:creationId xmlns:a16="http://schemas.microsoft.com/office/drawing/2014/main" id="{CC4EA2B5-7857-421E-8717-DE98505B8655}"/>
-              </a:ext>
-            </a:extLst>
-          </p:cNvPr>
-          <p:cNvPicPr>
-            <a:picLocks noChangeAspect="1"/>
-          </p:cNvPicPr>
-          <p:nvPr/>
-        </p:nvPicPr>
-        <p:blipFill>
-          <a:blip r:embed="rId9">
-            <a:extLst>
-              <a:ext uri="{28A0092B-C50C-407E-A947-70E740481C1C}">
-                <a14:useLocalDpi xmlns:a14="http://schemas.microsoft.com/office/drawing/2010/main" val="0"/>
-              </a:ext>
-            </a:extLst>
-          </a:blip>
-          <a:stretch>
-            <a:fillRect/>
-          </a:stretch>
-        </p:blipFill>
-        <p:spPr>
-          <a:xfrm>
-            <a:off x="5946306" y="2135402"/>
-            <a:ext cx="4386392" cy="856219"/>
-          </a:xfrm>
-          <a:prstGeom prst="rect">
-            <a:avLst/>
-          </a:prstGeom>
-        </p:spPr>
-      </p:pic>
-    </p:spTree>
-    <p:extLst>
-      <p:ext uri="{BB962C8B-B14F-4D97-AF65-F5344CB8AC3E}">
-        <p14:creationId xmlns:p14="http://schemas.microsoft.com/office/powerpoint/2010/main" val="3917785960"/>
-      </p:ext>
-    </p:extLst>
-  </p:cSld>
-  <p:clrMapOvr>
-    <a:masterClrMapping/>
-  </p:clrMapOvr>
-  <p:transition spd="slow">
-    <p:push dir="u"/>
-  </p:transition>
-  <p:timing>
-    <p:tnLst>
-      <p:par>
-        <p:cTn id="1" dur="indefinite" restart="never" nodeType="tmRoot">
-          <p:childTnLst>
-            <p:seq concurrent="1" nextAc="seek">
-              <p:cTn id="2" dur="indefinite" nodeType="mainSeq">
-                <p:childTnLst>
-                  <p:par>
-                    <p:cTn id="3" fill="hold">
-                      <p:stCondLst>
-                        <p:cond delay="indefinite"/>
-                      </p:stCondLst>
-                      <p:childTnLst>
-                        <p:par>
-                          <p:cTn id="4" fill="hold">
-                            <p:stCondLst>
-                              <p:cond delay="0"/>
-                            </p:stCondLst>
-                            <p:childTnLst>
-                              <p:par>
-                                <p:cTn id="5" presetID="22" presetClass="entr" presetSubtype="8" fill="hold" nodeType="clickEffect">
-                                  <p:stCondLst>
-                                    <p:cond delay="0"/>
-                                  </p:stCondLst>
-                                  <p:childTnLst>
-                                    <p:set>
-                                      <p:cBhvr>
-                                        <p:cTn id="6" dur="1" fill="hold">
-                                          <p:stCondLst>
-                                            <p:cond delay="0"/>
-                                          </p:stCondLst>
-                                        </p:cTn>
-                                        <p:tgtEl>
-                                          <p:spTgt spid="30"/>
-                                        </p:tgtEl>
-                                        <p:attrNameLst>
-                                          <p:attrName>style.visibility</p:attrName>
-                                        </p:attrNameLst>
-                                      </p:cBhvr>
-                                      <p:to>
-                                        <p:strVal val="visible"/>
-                                      </p:to>
-                                    </p:set>
-                                    <p:animEffect transition="in" filter="wipe(left)">
-                                      <p:cBhvr>
-                                        <p:cTn id="7" dur="500"/>
-                                        <p:tgtEl>
-                                          <p:spTgt spid="30"/>
-                                        </p:tgtEl>
-                                      </p:cBhvr>
-                                    </p:animEffect>
-                                  </p:childTnLst>
-                                </p:cTn>
-                              </p:par>
-                            </p:childTnLst>
-                          </p:cTn>
-                        </p:par>
-                      </p:childTnLst>
-                    </p:cTn>
-                  </p:par>
-                </p:childTnLst>
-              </p:cTn>
-              <p:prevCondLst>
-                <p:cond evt="onPrev" delay="0">
-                  <p:tgtEl>
-                    <p:sldTgt/>
-                  </p:tgtEl>
-                </p:cond>
-              </p:prevCondLst>
-              <p:nextCondLst>
-                <p:cond evt="onNext" delay="0">
-                  <p:tgtEl>
-                    <p:sldTgt/>
-                  </p:tgtEl>
-                </p:cond>
-              </p:nextCondLst>
-            </p:seq>
-          </p:childTnLst>
-        </p:cTn>
-      </p:par>
-    </p:tnLst>
   </p:timing>
 </p:sld>
 </file>

</xml_diff>